<commit_message>
A few tweaks to baysean network demo based on meeting
</commit_message>
<xml_diff>
--- a/2021.08.12/Bayesian Networks.pptx
+++ b/2021.08.12/Bayesian Networks.pptx
@@ -112,7 +112,41 @@
       </a:defRPr>
     </a:lvl9pPr>
   </p:defaultTextStyle>
+  <p:extLst>
+    <p:ext uri="{EFAFB233-063F-42B5-8137-9DF3F51BA10A}">
+      <p15:sldGuideLst xmlns:p15="http://schemas.microsoft.com/office/powerpoint/2012/main"/>
+    </p:ext>
+  </p:extLst>
 </p:presentation>
+</file>
+
+<file path=ppt/changesInfos/changesInfo1.xml><?xml version="1.0" encoding="utf-8"?>
+<pc:chgInfo xmlns:a="http://schemas.openxmlformats.org/drawingml/2006/main" xmlns:r="http://schemas.openxmlformats.org/officeDocument/2006/relationships" xmlns:ac="http://schemas.microsoft.com/office/drawing/2013/main/command" xmlns:pc="http://schemas.microsoft.com/office/powerpoint/2013/main/command">
+  <pc:docChgLst>
+    <pc:chgData name="Hartman, Rosemary@DWR" userId="984f44d5-4180-46ad-9b77-e367b17d9727" providerId="ADAL" clId="{0C0C7202-30C8-4408-AF48-42B4F5795E4A}"/>
+    <pc:docChg chg="custSel modSld">
+      <pc:chgData name="Hartman, Rosemary@DWR" userId="984f44d5-4180-46ad-9b77-e367b17d9727" providerId="ADAL" clId="{0C0C7202-30C8-4408-AF48-42B4F5795E4A}" dt="2021-08-12T19:56:33.474" v="45" actId="27636"/>
+      <pc:docMkLst>
+        <pc:docMk/>
+      </pc:docMkLst>
+      <pc:sldChg chg="modSp mod">
+        <pc:chgData name="Hartman, Rosemary@DWR" userId="984f44d5-4180-46ad-9b77-e367b17d9727" providerId="ADAL" clId="{0C0C7202-30C8-4408-AF48-42B4F5795E4A}" dt="2021-08-12T19:56:33.474" v="45" actId="27636"/>
+        <pc:sldMkLst>
+          <pc:docMk/>
+          <pc:sldMk cId="2882167382" sldId="256"/>
+        </pc:sldMkLst>
+        <pc:spChg chg="mod">
+          <ac:chgData name="Hartman, Rosemary@DWR" userId="984f44d5-4180-46ad-9b77-e367b17d9727" providerId="ADAL" clId="{0C0C7202-30C8-4408-AF48-42B4F5795E4A}" dt="2021-08-12T19:56:33.474" v="45" actId="27636"/>
+          <ac:spMkLst>
+            <pc:docMk/>
+            <pc:sldMk cId="2882167382" sldId="256"/>
+            <ac:spMk id="3" creationId="{413F250B-84A7-4542-A52F-1A376197F2FA}"/>
+          </ac:spMkLst>
+        </pc:spChg>
+      </pc:sldChg>
+    </pc:docChg>
+  </pc:docChgLst>
+</pc:chgInfo>
 </file>
 
 <file path=ppt/notesMasters/notesMaster1.xml><?xml version="1.0" encoding="utf-8"?>
@@ -197,7 +231,7 @@
           <a:p>
             <a:fld id="{F6793730-29C8-47BF-B71D-30C3C7951AD9}" type="datetimeFigureOut">
               <a:rPr lang="en-US" smtClean="0"/>
-              <a:t>8/9/2021</a:t>
+              <a:t>8/12/2021</a:t>
             </a:fld>
             <a:endParaRPr lang="en-US"/>
           </a:p>
@@ -704,7 +738,7 @@
           <a:p>
             <a:fld id="{78EFE257-49B2-4A75-9563-D5C21D3F01CA}" type="datetimeFigureOut">
               <a:rPr lang="en-US" smtClean="0"/>
-              <a:t>8/9/2021</a:t>
+              <a:t>8/12/2021</a:t>
             </a:fld>
             <a:endParaRPr lang="en-US"/>
           </a:p>
@@ -902,7 +936,7 @@
           <a:p>
             <a:fld id="{78EFE257-49B2-4A75-9563-D5C21D3F01CA}" type="datetimeFigureOut">
               <a:rPr lang="en-US" smtClean="0"/>
-              <a:t>8/9/2021</a:t>
+              <a:t>8/12/2021</a:t>
             </a:fld>
             <a:endParaRPr lang="en-US"/>
           </a:p>
@@ -1110,7 +1144,7 @@
           <a:p>
             <a:fld id="{78EFE257-49B2-4A75-9563-D5C21D3F01CA}" type="datetimeFigureOut">
               <a:rPr lang="en-US" smtClean="0"/>
-              <a:t>8/9/2021</a:t>
+              <a:t>8/12/2021</a:t>
             </a:fld>
             <a:endParaRPr lang="en-US"/>
           </a:p>
@@ -1308,7 +1342,7 @@
           <a:p>
             <a:fld id="{78EFE257-49B2-4A75-9563-D5C21D3F01CA}" type="datetimeFigureOut">
               <a:rPr lang="en-US" smtClean="0"/>
-              <a:t>8/9/2021</a:t>
+              <a:t>8/12/2021</a:t>
             </a:fld>
             <a:endParaRPr lang="en-US"/>
           </a:p>
@@ -1583,7 +1617,7 @@
           <a:p>
             <a:fld id="{78EFE257-49B2-4A75-9563-D5C21D3F01CA}" type="datetimeFigureOut">
               <a:rPr lang="en-US" smtClean="0"/>
-              <a:t>8/9/2021</a:t>
+              <a:t>8/12/2021</a:t>
             </a:fld>
             <a:endParaRPr lang="en-US"/>
           </a:p>
@@ -1848,7 +1882,7 @@
           <a:p>
             <a:fld id="{78EFE257-49B2-4A75-9563-D5C21D3F01CA}" type="datetimeFigureOut">
               <a:rPr lang="en-US" smtClean="0"/>
-              <a:t>8/9/2021</a:t>
+              <a:t>8/12/2021</a:t>
             </a:fld>
             <a:endParaRPr lang="en-US"/>
           </a:p>
@@ -2260,7 +2294,7 @@
           <a:p>
             <a:fld id="{78EFE257-49B2-4A75-9563-D5C21D3F01CA}" type="datetimeFigureOut">
               <a:rPr lang="en-US" smtClean="0"/>
-              <a:t>8/9/2021</a:t>
+              <a:t>8/12/2021</a:t>
             </a:fld>
             <a:endParaRPr lang="en-US"/>
           </a:p>
@@ -2401,7 +2435,7 @@
           <a:p>
             <a:fld id="{78EFE257-49B2-4A75-9563-D5C21D3F01CA}" type="datetimeFigureOut">
               <a:rPr lang="en-US" smtClean="0"/>
-              <a:t>8/9/2021</a:t>
+              <a:t>8/12/2021</a:t>
             </a:fld>
             <a:endParaRPr lang="en-US"/>
           </a:p>
@@ -2514,7 +2548,7 @@
           <a:p>
             <a:fld id="{78EFE257-49B2-4A75-9563-D5C21D3F01CA}" type="datetimeFigureOut">
               <a:rPr lang="en-US" smtClean="0"/>
-              <a:t>8/9/2021</a:t>
+              <a:t>8/12/2021</a:t>
             </a:fld>
             <a:endParaRPr lang="en-US"/>
           </a:p>
@@ -2825,7 +2859,7 @@
           <a:p>
             <a:fld id="{78EFE257-49B2-4A75-9563-D5C21D3F01CA}" type="datetimeFigureOut">
               <a:rPr lang="en-US" smtClean="0"/>
-              <a:t>8/9/2021</a:t>
+              <a:t>8/12/2021</a:t>
             </a:fld>
             <a:endParaRPr lang="en-US"/>
           </a:p>
@@ -3113,7 +3147,7 @@
           <a:p>
             <a:fld id="{78EFE257-49B2-4A75-9563-D5C21D3F01CA}" type="datetimeFigureOut">
               <a:rPr lang="en-US" smtClean="0"/>
-              <a:t>8/9/2021</a:t>
+              <a:t>8/12/2021</a:t>
             </a:fld>
             <a:endParaRPr lang="en-US"/>
           </a:p>
@@ -3354,7 +3388,7 @@
           <a:p>
             <a:fld id="{78EFE257-49B2-4A75-9563-D5C21D3F01CA}" type="datetimeFigureOut">
               <a:rPr lang="en-US" smtClean="0"/>
-              <a:t>8/9/2021</a:t>
+              <a:t>8/12/2021</a:t>
             </a:fld>
             <a:endParaRPr lang="en-US"/>
           </a:p>
@@ -3817,10 +3851,34 @@
         </p:nvSpPr>
         <p:spPr/>
         <p:txBody>
-          <a:bodyPr/>
-          <a:lstStyle/>
-          <a:p>
-            <a:endParaRPr lang="en-US"/>
+          <a:bodyPr>
+            <a:normAutofit fontScale="85000" lnSpcReduction="20000"/>
+          </a:bodyPr>
+          <a:lstStyle/>
+          <a:p>
+            <a:r>
+              <a:rPr lang="en-US" dirty="0"/>
+              <a:t>Rosemary Hartman</a:t>
+            </a:r>
+          </a:p>
+          <a:p>
+            <a:r>
+              <a:rPr lang="en-US" dirty="0"/>
+              <a:t>8/12/2021</a:t>
+            </a:r>
+          </a:p>
+          <a:p>
+            <a:r>
+              <a:rPr lang="en-US" dirty="0"/>
+              <a:t>Data Science PWT</a:t>
+            </a:r>
+          </a:p>
+          <a:p>
+            <a:r>
+              <a:rPr lang="en-US"/>
+              <a:t>https://github.com/InteragencyEcologicalProgram/DataScience/tree/master/2021.08.12</a:t>
+            </a:r>
+            <a:endParaRPr lang="en-US" dirty="0"/>
           </a:p>
         </p:txBody>
       </p:sp>

</xml_diff>